<commit_message>
Team report and briefing
</commit_message>
<xml_diff>
--- a/Briefings/Briefing6.pptx
+++ b/Briefings/Briefing6.pptx
@@ -14,7 +14,8 @@
     <p:sldId id="262" r:id="rId8"/>
     <p:sldId id="263" r:id="rId9"/>
     <p:sldId id="265" r:id="rId10"/>
-    <p:sldId id="264" r:id="rId11"/>
+    <p:sldId id="266" r:id="rId11"/>
+    <p:sldId id="264" r:id="rId12"/>
   </p:sldIdLst>
   <p:sldSz cx="9144000" cy="6858000" type="screen4x3"/>
   <p:notesSz cx="6858000" cy="9144000"/>
@@ -324,7 +325,7 @@
             <a:fld id="{542ED6D8-967B-4FDD-8539-23116DD8CE38}" type="datetimeFigureOut">
               <a:rPr lang="en-US" smtClean="0"/>
               <a:pPr/>
-              <a:t>1/4/2015</a:t>
+              <a:t>1/6/2015</a:t>
             </a:fld>
             <a:endParaRPr lang="en-US"/>
           </a:p>
@@ -520,7 +521,7 @@
             <a:fld id="{542ED6D8-967B-4FDD-8539-23116DD8CE38}" type="datetimeFigureOut">
               <a:rPr lang="en-US" smtClean="0"/>
               <a:pPr/>
-              <a:t>1/4/2015</a:t>
+              <a:t>1/6/2015</a:t>
             </a:fld>
             <a:endParaRPr lang="en-US"/>
           </a:p>
@@ -710,7 +711,7 @@
             <a:fld id="{542ED6D8-967B-4FDD-8539-23116DD8CE38}" type="datetimeFigureOut">
               <a:rPr lang="en-US" smtClean="0"/>
               <a:pPr/>
-              <a:t>1/4/2015</a:t>
+              <a:t>1/6/2015</a:t>
             </a:fld>
             <a:endParaRPr lang="en-US"/>
           </a:p>
@@ -941,7 +942,7 @@
             <a:fld id="{542ED6D8-967B-4FDD-8539-23116DD8CE38}" type="datetimeFigureOut">
               <a:rPr lang="en-US" smtClean="0"/>
               <a:pPr/>
-              <a:t>1/4/2015</a:t>
+              <a:t>1/6/2015</a:t>
             </a:fld>
             <a:endParaRPr lang="en-US"/>
           </a:p>
@@ -1224,7 +1225,7 @@
             <a:fld id="{542ED6D8-967B-4FDD-8539-23116DD8CE38}" type="datetimeFigureOut">
               <a:rPr lang="en-US" smtClean="0"/>
               <a:pPr/>
-              <a:t>1/4/2015</a:t>
+              <a:t>1/6/2015</a:t>
             </a:fld>
             <a:endParaRPr lang="en-US"/>
           </a:p>
@@ -1514,7 +1515,7 @@
             <a:fld id="{542ED6D8-967B-4FDD-8539-23116DD8CE38}" type="datetimeFigureOut">
               <a:rPr lang="en-US" smtClean="0"/>
               <a:pPr/>
-              <a:t>1/4/2015</a:t>
+              <a:t>1/6/2015</a:t>
             </a:fld>
             <a:endParaRPr lang="en-US"/>
           </a:p>
@@ -2070,7 +2071,7 @@
             <a:fld id="{542ED6D8-967B-4FDD-8539-23116DD8CE38}" type="datetimeFigureOut">
               <a:rPr lang="en-US" smtClean="0"/>
               <a:pPr/>
-              <a:t>1/4/2015</a:t>
+              <a:t>1/6/2015</a:t>
             </a:fld>
             <a:endParaRPr lang="en-US"/>
           </a:p>
@@ -2203,7 +2204,7 @@
             <a:fld id="{542ED6D8-967B-4FDD-8539-23116DD8CE38}" type="datetimeFigureOut">
               <a:rPr lang="en-US" smtClean="0"/>
               <a:pPr/>
-              <a:t>1/4/2015</a:t>
+              <a:t>1/6/2015</a:t>
             </a:fld>
             <a:endParaRPr lang="en-US"/>
           </a:p>
@@ -2355,7 +2356,7 @@
             <a:fld id="{542ED6D8-967B-4FDD-8539-23116DD8CE38}" type="datetimeFigureOut">
               <a:rPr lang="en-US" smtClean="0"/>
               <a:pPr/>
-              <a:t>1/4/2015</a:t>
+              <a:t>1/6/2015</a:t>
             </a:fld>
             <a:endParaRPr lang="en-US"/>
           </a:p>
@@ -2678,7 +2679,7 @@
             <a:fld id="{542ED6D8-967B-4FDD-8539-23116DD8CE38}" type="datetimeFigureOut">
               <a:rPr lang="en-US" smtClean="0"/>
               <a:pPr/>
-              <a:t>1/4/2015</a:t>
+              <a:t>1/6/2015</a:t>
             </a:fld>
             <a:endParaRPr lang="en-US"/>
           </a:p>
@@ -2977,7 +2978,7 @@
             <a:fld id="{542ED6D8-967B-4FDD-8539-23116DD8CE38}" type="datetimeFigureOut">
               <a:rPr lang="en-US" smtClean="0"/>
               <a:pPr/>
-              <a:t>1/4/2015</a:t>
+              <a:t>1/6/2015</a:t>
             </a:fld>
             <a:endParaRPr lang="en-US"/>
           </a:p>
@@ -3224,7 +3225,7 @@
             <a:fld id="{542ED6D8-967B-4FDD-8539-23116DD8CE38}" type="datetimeFigureOut">
               <a:rPr lang="en-US" smtClean="0"/>
               <a:pPr/>
-              <a:t>1/4/2015</a:t>
+              <a:t>1/6/2015</a:t>
             </a:fld>
             <a:endParaRPr lang="en-US"/>
           </a:p>
@@ -3850,6 +3851,78 @@
             <a:pPr algn="ctr"/>
             <a:r>
               <a:rPr lang="en-US" dirty="0" smtClean="0"/>
+              <a:t>File Structure</a:t>
+            </a:r>
+            <a:endParaRPr lang="en-US" dirty="0"/>
+          </a:p>
+        </p:txBody>
+      </p:sp>
+      <p:pic>
+        <p:nvPicPr>
+          <p:cNvPr id="4" name="Content Placeholder 3" descr="LocalData.png"/>
+          <p:cNvPicPr>
+            <a:picLocks noGrp="1" noChangeAspect="1"/>
+          </p:cNvPicPr>
+          <p:nvPr>
+            <p:ph idx="1"/>
+          </p:nvPr>
+        </p:nvPicPr>
+        <p:blipFill>
+          <a:blip r:embed="rId2" cstate="print"/>
+          <a:stretch>
+            <a:fillRect/>
+          </a:stretch>
+        </p:blipFill>
+        <p:spPr>
+          <a:xfrm>
+            <a:off x="533400" y="1501510"/>
+            <a:ext cx="8077200" cy="5204090"/>
+          </a:xfrm>
+        </p:spPr>
+      </p:pic>
+    </p:spTree>
+  </p:cSld>
+  <p:clrMapOvr>
+    <a:masterClrMapping/>
+  </p:clrMapOvr>
+</p:sld>
+</file>
+
+<file path=ppt/slides/slide11.xml><?xml version="1.0" encoding="utf-8"?>
+<p:sld xmlns:a="http://schemas.openxmlformats.org/drawingml/2006/main" xmlns:r="http://schemas.openxmlformats.org/officeDocument/2006/relationships" xmlns:p="http://schemas.openxmlformats.org/presentationml/2006/main">
+  <p:cSld>
+    <p:spTree>
+      <p:nvGrpSpPr>
+        <p:cNvPr id="1" name=""/>
+        <p:cNvGrpSpPr/>
+        <p:nvPr/>
+      </p:nvGrpSpPr>
+      <p:grpSpPr>
+        <a:xfrm>
+          <a:off x="0" y="0"/>
+          <a:ext cx="0" cy="0"/>
+          <a:chOff x="0" y="0"/>
+          <a:chExt cx="0" cy="0"/>
+        </a:xfrm>
+      </p:grpSpPr>
+      <p:sp>
+        <p:nvSpPr>
+          <p:cNvPr id="2" name="Title 1"/>
+          <p:cNvSpPr>
+            <a:spLocks noGrp="1"/>
+          </p:cNvSpPr>
+          <p:nvPr>
+            <p:ph type="title"/>
+          </p:nvPr>
+        </p:nvSpPr>
+        <p:spPr/>
+        <p:txBody>
+          <a:bodyPr/>
+          <a:lstStyle/>
+          <a:p>
+            <a:pPr algn="ctr"/>
+            <a:r>
+              <a:rPr lang="en-US" dirty="0" smtClean="0"/>
               <a:t>Where We’re Going</a:t>
             </a:r>
             <a:endParaRPr lang="en-US" dirty="0"/>
@@ -4499,7 +4572,15 @@
           <a:p>
             <a:r>
               <a:rPr lang="en-US" dirty="0" smtClean="0"/>
-              <a:t>Wrote methods to package up data </a:t>
+              <a:t>Wrote methods to package up data using </a:t>
+            </a:r>
+            <a:r>
+              <a:rPr lang="en-US" dirty="0" err="1" smtClean="0"/>
+              <a:t>Newtonsoft.JSON</a:t>
+            </a:r>
+            <a:r>
+              <a:rPr lang="en-US" dirty="0" smtClean="0"/>
+              <a:t> </a:t>
             </a:r>
             <a:endParaRPr lang="en-US" dirty="0"/>
           </a:p>

</xml_diff>